<commit_message>
Syls final changes for friday
</commit_message>
<xml_diff>
--- a/Presentation.pptx
+++ b/Presentation.pptx
@@ -5,7 +5,7 @@
     <p:sldMasterId id="2147483648" r:id="rId1"/>
   </p:sldMasterIdLst>
   <p:notesMasterIdLst>
-    <p:notesMasterId r:id="rId15"/>
+    <p:notesMasterId r:id="rId16"/>
   </p:notesMasterIdLst>
   <p:sldIdLst>
     <p:sldId id="259" r:id="rId2"/>
@@ -21,6 +21,7 @@
     <p:sldId id="271" r:id="rId12"/>
     <p:sldId id="268" r:id="rId13"/>
     <p:sldId id="273" r:id="rId14"/>
+    <p:sldId id="274" r:id="rId15"/>
   </p:sldIdLst>
   <p:sldSz cx="12192000" cy="6858000"/>
   <p:notesSz cx="6858000" cy="9144000"/>
@@ -3815,7 +3816,7 @@
         <p:spPr>
           <a:xfrm>
             <a:off x="8062770" y="1324379"/>
-            <a:ext cx="4129229" cy="2677656"/>
+            <a:ext cx="4129229" cy="3785652"/>
           </a:xfrm>
           <a:prstGeom prst="rect">
             <a:avLst/>
@@ -3837,7 +3838,48 @@
                   <a:srgbClr val="003B46"/>
                 </a:solidFill>
               </a:rPr>
-              <a:t>Tourism WA has engaged our small firm to present the UV index and the temperature weather data for residents and tourists to increase the use of sunscreen and to prevent skin cancer.</a:t>
+              <a:t>Tourism WA has started a campaign to raise awareness of the UV Index values in WA.</a:t>
+            </a:r>
+          </a:p>
+          <a:p>
+            <a:pPr algn="ctr"/>
+            <a:endParaRPr lang="en-US" sz="2400" dirty="0">
+              <a:solidFill>
+                <a:srgbClr val="003B46"/>
+              </a:solidFill>
+            </a:endParaRPr>
+          </a:p>
+          <a:p>
+            <a:pPr algn="ctr"/>
+            <a:r>
+              <a:rPr lang="en-US" sz="2400" dirty="0">
+                <a:solidFill>
+                  <a:srgbClr val="003B46"/>
+                </a:solidFill>
+              </a:rPr>
+              <a:t>They have engaged us to present the UV index and its values to residents and tourists to ensure they</a:t>
+            </a:r>
+          </a:p>
+          <a:p>
+            <a:pPr algn="ctr"/>
+            <a:r>
+              <a:rPr lang="en-US" sz="2400" dirty="0">
+                <a:solidFill>
+                  <a:srgbClr val="003B46"/>
+                </a:solidFill>
+              </a:rPr>
+              <a:t>SLIP, SLOP, SLAP, SEEK, SLIDE</a:t>
+            </a:r>
+          </a:p>
+          <a:p>
+            <a:pPr algn="ctr"/>
+            <a:r>
+              <a:rPr lang="en-US" sz="2400" dirty="0">
+                <a:solidFill>
+                  <a:srgbClr val="003B46"/>
+                </a:solidFill>
+              </a:rPr>
+              <a:t> to prevent skin cancer.</a:t>
             </a:r>
             <a:endParaRPr lang="en-AU" sz="2400" dirty="0">
               <a:solidFill>
@@ -3861,8 +3903,8 @@
         </p:nvSpPr>
         <p:spPr>
           <a:xfrm>
-            <a:off x="8062768" y="4002034"/>
-            <a:ext cx="4129231" cy="2191657"/>
+            <a:off x="8062768" y="5110031"/>
+            <a:ext cx="4129231" cy="1083660"/>
           </a:xfrm>
           <a:prstGeom prst="rect">
             <a:avLst/>
@@ -6206,7 +6248,7 @@
         <p:spPr>
           <a:xfrm>
             <a:off x="536713" y="4180344"/>
-            <a:ext cx="11340548" cy="2677656"/>
+            <a:ext cx="11340548" cy="2308324"/>
           </a:xfrm>
           <a:prstGeom prst="rect">
             <a:avLst/>
@@ -6233,13 +6275,6 @@
             </a:r>
           </a:p>
           <a:p>
-            <a:endParaRPr lang="en-AU" sz="2400" dirty="0">
-              <a:solidFill>
-                <a:srgbClr val="003B46"/>
-              </a:solidFill>
-            </a:endParaRPr>
-          </a:p>
-          <a:p>
             <a:pPr marL="285750" indent="-285750">
               <a:buFont typeface="Arial" panose="020B0604020202020204" pitchFamily="34" charset="0"/>
               <a:buChar char="•"/>
@@ -6258,11 +6293,14 @@
               <a:buFont typeface="Arial" panose="020B0604020202020204" pitchFamily="34" charset="0"/>
               <a:buChar char="•"/>
             </a:pPr>
-            <a:endParaRPr lang="en-AU" sz="2400" dirty="0">
-              <a:solidFill>
-                <a:srgbClr val="003B46"/>
-              </a:solidFill>
-            </a:endParaRPr>
+            <a:r>
+              <a:rPr lang="en-AU" sz="2400" dirty="0">
+                <a:solidFill>
+                  <a:srgbClr val="003B46"/>
+                </a:solidFill>
+              </a:rPr>
+              <a:t>We could have added more layers of information showing the influence of, for example, the cloud coverage on the UV index.</a:t>
+            </a:r>
           </a:p>
           <a:p>
             <a:pPr marL="285750" indent="-285750">
@@ -6275,7 +6313,7 @@
                   <a:srgbClr val="003B46"/>
                 </a:solidFill>
               </a:rPr>
-              <a:t>We could have added more layers of information showing the influence of, for example, the cloud coverage on the UV index.</a:t>
+              <a:t>We could have linked the maps to the filters in the search fields.</a:t>
             </a:r>
           </a:p>
         </p:txBody>
@@ -6284,6 +6322,79 @@
     <p:extLst>
       <p:ext uri="{BB962C8B-B14F-4D97-AF65-F5344CB8AC3E}">
         <p14:creationId xmlns:p14="http://schemas.microsoft.com/office/powerpoint/2010/main" val="1047935463"/>
+      </p:ext>
+    </p:extLst>
+  </p:cSld>
+  <p:clrMapOvr>
+    <a:masterClrMapping/>
+  </p:clrMapOvr>
+</p:sld>
+</file>
+
+<file path=ppt/slides/slide14.xml><?xml version="1.0" encoding="utf-8"?>
+<p:sld xmlns:a="http://schemas.openxmlformats.org/drawingml/2006/main" xmlns:r="http://schemas.openxmlformats.org/officeDocument/2006/relationships" xmlns:p="http://schemas.openxmlformats.org/presentationml/2006/main">
+  <p:cSld>
+    <p:spTree>
+      <p:nvGrpSpPr>
+        <p:cNvPr id="1" name=""/>
+        <p:cNvGrpSpPr/>
+        <p:nvPr/>
+      </p:nvGrpSpPr>
+      <p:grpSpPr>
+        <a:xfrm>
+          <a:off x="0" y="0"/>
+          <a:ext cx="0" cy="0"/>
+          <a:chOff x="0" y="0"/>
+          <a:chExt cx="0" cy="0"/>
+        </a:xfrm>
+      </p:grpSpPr>
+      <p:sp>
+        <p:nvSpPr>
+          <p:cNvPr id="2" name="TextBox 1">
+            <a:extLst>
+              <a:ext uri="{FF2B5EF4-FFF2-40B4-BE49-F238E27FC236}">
+                <a16:creationId xmlns:a16="http://schemas.microsoft.com/office/drawing/2014/main" id="{7F4050F2-C7CD-3B45-B37B-E87A14A33A17}"/>
+              </a:ext>
+            </a:extLst>
+          </p:cNvPr>
+          <p:cNvSpPr txBox="1"/>
+          <p:nvPr/>
+        </p:nvSpPr>
+        <p:spPr>
+          <a:xfrm>
+            <a:off x="878909" y="2767280"/>
+            <a:ext cx="10434181" cy="1323439"/>
+          </a:xfrm>
+          <a:prstGeom prst="rect">
+            <a:avLst/>
+          </a:prstGeom>
+          <a:solidFill>
+            <a:srgbClr val="66A5AD"/>
+          </a:solidFill>
+        </p:spPr>
+        <p:txBody>
+          <a:bodyPr wrap="square" rtlCol="0">
+            <a:spAutoFit/>
+          </a:bodyPr>
+          <a:lstStyle/>
+          <a:p>
+            <a:pPr algn="ctr"/>
+            <a:r>
+              <a:rPr lang="en-US" sz="8000" dirty="0">
+                <a:solidFill>
+                  <a:srgbClr val="003B46"/>
+                </a:solidFill>
+                <a:latin typeface="+mj-lt"/>
+              </a:rPr>
+              <a:t>??   Questions   ??</a:t>
+            </a:r>
+          </a:p>
+        </p:txBody>
+      </p:sp>
+    </p:spTree>
+    <p:extLst>
+      <p:ext uri="{BB962C8B-B14F-4D97-AF65-F5344CB8AC3E}">
+        <p14:creationId xmlns:p14="http://schemas.microsoft.com/office/powerpoint/2010/main" val="846242434"/>
       </p:ext>
     </p:extLst>
   </p:cSld>
@@ -8086,7 +8197,7 @@
                   <a:srgbClr val="003B46"/>
                 </a:solidFill>
               </a:rPr>
-              <a:t>Current UV Index of today</a:t>
+              <a:t>Health advice</a:t>
             </a:r>
           </a:p>
           <a:p>
@@ -8114,7 +8225,7 @@
                   <a:srgbClr val="003B46"/>
                 </a:solidFill>
               </a:rPr>
-              <a:t>7-day forecast</a:t>
+              <a:t>Current UV Index of today</a:t>
             </a:r>
           </a:p>
           <a:p>
@@ -8128,7 +8239,7 @@
                   <a:srgbClr val="003B46"/>
                 </a:solidFill>
               </a:rPr>
-              <a:t>Health advice</a:t>
+              <a:t>7-day forecast</a:t>
             </a:r>
           </a:p>
         </p:txBody>
@@ -8203,8 +8314,8 @@
         </p:nvSpPr>
         <p:spPr>
           <a:xfrm>
-            <a:off x="8408504" y="4087428"/>
-            <a:ext cx="3783495" cy="1109712"/>
+            <a:off x="8408504" y="4101210"/>
+            <a:ext cx="3783495" cy="1095930"/>
           </a:xfrm>
           <a:prstGeom prst="rect">
             <a:avLst/>

</xml_diff>